<commit_message>
refine june 28 opening slides
refine list of ISO WGs
</commit_message>
<xml_diff>
--- a/PRESENTATIONS/2021-06-online-f2f/2021-06-28-WoT-F2F-Opening-McCool.pptx
+++ b/PRESENTATIONS/2021-06-online-f2f/2021-06-28-WoT-F2F-Opening-McCool.pptx
@@ -4990,8 +4990,8 @@
         </p:nvSpPr>
         <p:spPr>
           <a:xfrm>
-            <a:off x="838200" y="1690688"/>
-            <a:ext cx="10515600" cy="4486275"/>
+            <a:off x="838200" y="1570892"/>
+            <a:ext cx="10515600" cy="4606071"/>
           </a:xfrm>
         </p:spPr>
         <p:txBody>
@@ -5035,7 +5035,7 @@
             <a:pPr lvl="1"/>
             <a:r>
               <a:rPr lang="en-CA" dirty="0"/>
-              <a:t>ITU-T (20m) – </a:t>
+              <a:t>ITU-T Q2/20 &amp; Q4/20 (20m) – </a:t>
             </a:r>
             <a:r>
               <a:rPr lang="en-CA" dirty="0" err="1"/>
@@ -5051,8 +5051,13 @@
             </a:r>
             <a:r>
               <a:rPr lang="en-CA" dirty="0"/>
-              <a:t> Lee</a:t>
-            </a:r>
+              <a:t> Lee/Marco </a:t>
+            </a:r>
+            <a:r>
+              <a:rPr lang="en-CA" dirty="0" err="1"/>
+              <a:t>Carugi</a:t>
+            </a:r>
+            <a:endParaRPr lang="en-CA" dirty="0"/>
           </a:p>
           <a:p>
             <a:r>
@@ -5082,7 +5087,7 @@
             <a:pPr lvl="1"/>
             <a:r>
               <a:rPr lang="en-CA" dirty="0"/>
-              <a:t>ISO TC184/SC4 (about IEC CDD) (20m) – Hiroshi Murayama/Yoshiaki </a:t>
+              <a:t>ISO TC184/SC4 (incl. JWG24, IEC SC3D, WG12, WG23, OTD, IEC CDD, etc.) (20m) – Hiroshi Murayama/Yoshiaki </a:t>
             </a:r>
             <a:r>
               <a:rPr lang="en-CA" dirty="0" err="1"/>

</xml_diff>